<commit_message>
Week 2 Session 2
</commit_message>
<xml_diff>
--- a/Week 2/week2.pptx
+++ b/Week 2/week2.pptx
@@ -11,10 +11,16 @@
     <p:sldId id="259" r:id="rId5"/>
     <p:sldId id="260" r:id="rId6"/>
     <p:sldId id="264" r:id="rId7"/>
-    <p:sldId id="261" r:id="rId8"/>
-    <p:sldId id="262" r:id="rId9"/>
-    <p:sldId id="263" r:id="rId10"/>
-    <p:sldId id="265" r:id="rId11"/>
+    <p:sldId id="266" r:id="rId8"/>
+    <p:sldId id="267" r:id="rId9"/>
+    <p:sldId id="268" r:id="rId10"/>
+    <p:sldId id="269" r:id="rId11"/>
+    <p:sldId id="270" r:id="rId12"/>
+    <p:sldId id="271" r:id="rId13"/>
+    <p:sldId id="261" r:id="rId14"/>
+    <p:sldId id="262" r:id="rId15"/>
+    <p:sldId id="263" r:id="rId16"/>
+    <p:sldId id="265" r:id="rId17"/>
   </p:sldIdLst>
   <p:sldSz cx="12192000" cy="6858000"/>
   <p:notesSz cx="6858000" cy="9144000"/>
@@ -113,6 +119,11 @@
       </a:defRPr>
     </a:lvl9pPr>
   </p:defaultTextStyle>
+  <p:extLst>
+    <p:ext uri="{EFAFB233-063F-42B5-8137-9DF3F51BA10A}">
+      <p15:sldGuideLst xmlns:p15="http://schemas.microsoft.com/office/powerpoint/2012/main"/>
+    </p:ext>
+  </p:extLst>
 </p:presentation>
 </file>
 
@@ -286,7 +297,7 @@
           <a:p>
             <a:fld id="{4EA06712-4E47-C646-B728-1FC1AA04CC59}" type="datetimeFigureOut">
               <a:rPr lang="en-TR" smtClean="0"/>
-              <a:t>30.12.2023</a:t>
+              <a:t>1.01.2024</a:t>
             </a:fld>
             <a:endParaRPr lang="en-TR"/>
           </a:p>
@@ -553,7 +564,7 @@
           <a:p>
             <a:fld id="{4EA06712-4E47-C646-B728-1FC1AA04CC59}" type="datetimeFigureOut">
               <a:rPr lang="en-TR" smtClean="0"/>
-              <a:t>30.12.2023</a:t>
+              <a:t>1.01.2024</a:t>
             </a:fld>
             <a:endParaRPr lang="en-TR"/>
           </a:p>
@@ -784,7 +795,7 @@
           <a:p>
             <a:fld id="{4EA06712-4E47-C646-B728-1FC1AA04CC59}" type="datetimeFigureOut">
               <a:rPr lang="en-TR" smtClean="0"/>
-              <a:t>30.12.2023</a:t>
+              <a:t>1.01.2024</a:t>
             </a:fld>
             <a:endParaRPr lang="en-TR"/>
           </a:p>
@@ -1094,7 +1105,7 @@
           <a:p>
             <a:fld id="{4EA06712-4E47-C646-B728-1FC1AA04CC59}" type="datetimeFigureOut">
               <a:rPr lang="en-TR" smtClean="0"/>
-              <a:t>30.12.2023</a:t>
+              <a:t>1.01.2024</a:t>
             </a:fld>
             <a:endParaRPr lang="en-TR"/>
           </a:p>
@@ -1567,7 +1578,7 @@
           <a:p>
             <a:fld id="{4EA06712-4E47-C646-B728-1FC1AA04CC59}" type="datetimeFigureOut">
               <a:rPr lang="en-TR" smtClean="0"/>
-              <a:t>30.12.2023</a:t>
+              <a:t>1.01.2024</a:t>
             </a:fld>
             <a:endParaRPr lang="en-TR"/>
           </a:p>
@@ -2114,7 +2125,7 @@
           <a:p>
             <a:fld id="{4EA06712-4E47-C646-B728-1FC1AA04CC59}" type="datetimeFigureOut">
               <a:rPr lang="en-TR" smtClean="0"/>
-              <a:t>30.12.2023</a:t>
+              <a:t>1.01.2024</a:t>
             </a:fld>
             <a:endParaRPr lang="en-TR"/>
           </a:p>
@@ -2888,7 +2899,7 @@
           <a:p>
             <a:fld id="{4EA06712-4E47-C646-B728-1FC1AA04CC59}" type="datetimeFigureOut">
               <a:rPr lang="en-TR" smtClean="0"/>
-              <a:t>30.12.2023</a:t>
+              <a:t>1.01.2024</a:t>
             </a:fld>
             <a:endParaRPr lang="en-TR"/>
           </a:p>
@@ -3063,7 +3074,7 @@
           <a:p>
             <a:fld id="{4EA06712-4E47-C646-B728-1FC1AA04CC59}" type="datetimeFigureOut">
               <a:rPr lang="en-TR" smtClean="0"/>
-              <a:t>30.12.2023</a:t>
+              <a:t>1.01.2024</a:t>
             </a:fld>
             <a:endParaRPr lang="en-TR"/>
           </a:p>
@@ -3286,7 +3297,7 @@
           <a:p>
             <a:fld id="{4EA06712-4E47-C646-B728-1FC1AA04CC59}" type="datetimeFigureOut">
               <a:rPr lang="en-TR" smtClean="0"/>
-              <a:t>30.12.2023</a:t>
+              <a:t>1.01.2024</a:t>
             </a:fld>
             <a:endParaRPr lang="en-TR"/>
           </a:p>
@@ -3466,7 +3477,7 @@
           <a:p>
             <a:fld id="{4EA06712-4E47-C646-B728-1FC1AA04CC59}" type="datetimeFigureOut">
               <a:rPr lang="en-TR" smtClean="0"/>
-              <a:t>30.12.2023</a:t>
+              <a:t>1.01.2024</a:t>
             </a:fld>
             <a:endParaRPr lang="en-TR"/>
           </a:p>
@@ -3755,7 +3766,7 @@
           <a:p>
             <a:fld id="{4EA06712-4E47-C646-B728-1FC1AA04CC59}" type="datetimeFigureOut">
               <a:rPr lang="en-TR" smtClean="0"/>
-              <a:t>30.12.2023</a:t>
+              <a:t>1.01.2024</a:t>
             </a:fld>
             <a:endParaRPr lang="en-TR"/>
           </a:p>
@@ -3997,7 +4008,7 @@
           <a:p>
             <a:fld id="{4EA06712-4E47-C646-B728-1FC1AA04CC59}" type="datetimeFigureOut">
               <a:rPr lang="en-TR" smtClean="0"/>
-              <a:t>30.12.2023</a:t>
+              <a:t>1.01.2024</a:t>
             </a:fld>
             <a:endParaRPr lang="en-TR"/>
           </a:p>
@@ -4376,7 +4387,7 @@
           <a:p>
             <a:fld id="{4EA06712-4E47-C646-B728-1FC1AA04CC59}" type="datetimeFigureOut">
               <a:rPr lang="en-TR" smtClean="0"/>
-              <a:t>30.12.2023</a:t>
+              <a:t>1.01.2024</a:t>
             </a:fld>
             <a:endParaRPr lang="en-TR"/>
           </a:p>
@@ -4494,7 +4505,7 @@
           <a:p>
             <a:fld id="{4EA06712-4E47-C646-B728-1FC1AA04CC59}" type="datetimeFigureOut">
               <a:rPr lang="en-TR" smtClean="0"/>
-              <a:t>30.12.2023</a:t>
+              <a:t>1.01.2024</a:t>
             </a:fld>
             <a:endParaRPr lang="en-TR"/>
           </a:p>
@@ -4589,7 +4600,7 @@
           <a:p>
             <a:fld id="{4EA06712-4E47-C646-B728-1FC1AA04CC59}" type="datetimeFigureOut">
               <a:rPr lang="en-TR" smtClean="0"/>
-              <a:t>30.12.2023</a:t>
+              <a:t>1.01.2024</a:t>
             </a:fld>
             <a:endParaRPr lang="en-TR"/>
           </a:p>
@@ -4838,7 +4849,7 @@
           <a:p>
             <a:fld id="{4EA06712-4E47-C646-B728-1FC1AA04CC59}" type="datetimeFigureOut">
               <a:rPr lang="en-TR" smtClean="0"/>
-              <a:t>30.12.2023</a:t>
+              <a:t>1.01.2024</a:t>
             </a:fld>
             <a:endParaRPr lang="en-TR"/>
           </a:p>
@@ -5095,7 +5106,7 @@
           <a:p>
             <a:fld id="{4EA06712-4E47-C646-B728-1FC1AA04CC59}" type="datetimeFigureOut">
               <a:rPr lang="en-TR" smtClean="0"/>
-              <a:t>30.12.2023</a:t>
+              <a:t>1.01.2024</a:t>
             </a:fld>
             <a:endParaRPr lang="en-TR"/>
           </a:p>
@@ -5338,7 +5349,7 @@
           <a:p>
             <a:fld id="{4EA06712-4E47-C646-B728-1FC1AA04CC59}" type="datetimeFigureOut">
               <a:rPr lang="en-TR" smtClean="0"/>
-              <a:t>30.12.2023</a:t>
+              <a:t>1.01.2024</a:t>
             </a:fld>
             <a:endParaRPr lang="en-TR"/>
           </a:p>
@@ -5882,6 +5893,1286 @@
           <p:cNvPr id="2" name="Title 1">
             <a:extLst>
               <a:ext uri="{FF2B5EF4-FFF2-40B4-BE49-F238E27FC236}">
+                <a16:creationId xmlns:a16="http://schemas.microsoft.com/office/drawing/2014/main" id="{C73CDEE3-7895-715E-9081-326EAB75A073}"/>
+              </a:ext>
+            </a:extLst>
+          </p:cNvPr>
+          <p:cNvSpPr>
+            <a:spLocks noGrp="1"/>
+          </p:cNvSpPr>
+          <p:nvPr>
+            <p:ph type="title"/>
+          </p:nvPr>
+        </p:nvSpPr>
+        <p:spPr/>
+        <p:txBody>
+          <a:bodyPr/>
+          <a:lstStyle/>
+          <a:p>
+            <a:pPr algn="r" defTabSz="914400" rtl="1" eaLnBrk="1" latinLnBrk="0" hangingPunct="1">
+              <a:lnSpc>
+                <a:spcPct val="90000"/>
+              </a:lnSpc>
+              <a:spcBef>
+                <a:spcPct val="0"/>
+              </a:spcBef>
+              <a:buNone/>
+            </a:pPr>
+            <a:r>
+              <a:rPr lang="ar-SA" dirty="0"/>
+              <a:t>مجال البلوك</a:t>
+            </a:r>
+            <a:endParaRPr lang="en-TR" dirty="0"/>
+          </a:p>
+        </p:txBody>
+      </p:sp>
+      <p:sp>
+        <p:nvSpPr>
+          <p:cNvPr id="3" name="Content Placeholder 2">
+            <a:extLst>
+              <a:ext uri="{FF2B5EF4-FFF2-40B4-BE49-F238E27FC236}">
+                <a16:creationId xmlns:a16="http://schemas.microsoft.com/office/drawing/2014/main" id="{CD2976A2-813A-D06A-C47B-C85436BB3205}"/>
+              </a:ext>
+            </a:extLst>
+          </p:cNvPr>
+          <p:cNvSpPr>
+            <a:spLocks noGrp="1"/>
+          </p:cNvSpPr>
+          <p:nvPr>
+            <p:ph idx="1"/>
+          </p:nvPr>
+        </p:nvSpPr>
+        <p:spPr/>
+        <p:txBody>
+          <a:bodyPr/>
+          <a:lstStyle/>
+          <a:p>
+            <a:pPr marL="228600" indent="-228600" algn="r" defTabSz="914400" rtl="1" eaLnBrk="1" latinLnBrk="0" hangingPunct="1">
+              <a:lnSpc>
+                <a:spcPct val="90000"/>
+              </a:lnSpc>
+              <a:spcBef>
+                <a:spcPts val="1000"/>
+              </a:spcBef>
+              <a:buFont typeface="Arial" panose="020B0604020202020204" pitchFamily="34" charset="0"/>
+              <a:buChar char="•"/>
+            </a:pPr>
+            <a:r>
+              <a:rPr lang="ar-SA" dirty="0"/>
+              <a:t>تم تقديم المتغيرات المعلنة داخل البلوك {}، التي تم تقديمها في </a:t>
+            </a:r>
+            <a:r>
+              <a:rPr lang="en-US" dirty="0"/>
+              <a:t>ES6</a:t>
+            </a:r>
+            <a:r>
+              <a:rPr lang="ar-SA" dirty="0"/>
+              <a:t> </a:t>
+            </a:r>
+            <a:r>
+              <a:rPr lang="en-US" dirty="0"/>
+              <a:t>، </a:t>
+            </a:r>
+            <a:r>
+              <a:rPr lang="ar-SA" dirty="0"/>
+              <a:t>باستخدام </a:t>
+            </a:r>
+            <a:r>
+              <a:rPr lang="en-US" dirty="0"/>
+              <a:t>Let </a:t>
+            </a:r>
+            <a:r>
+              <a:rPr lang="ar-SA" dirty="0"/>
+              <a:t> أو </a:t>
+            </a:r>
+            <a:r>
+              <a:rPr lang="en-US" dirty="0"/>
+              <a:t>const</a:t>
+            </a:r>
+            <a:r>
+              <a:rPr lang="ar-SA" dirty="0"/>
+              <a:t> </a:t>
+            </a:r>
+            <a:r>
+              <a:rPr lang="en-US" dirty="0"/>
+              <a:t> </a:t>
+            </a:r>
+            <a:r>
+              <a:rPr lang="ar-SA" dirty="0"/>
+              <a:t>ضمن مجال البلوك.</a:t>
+            </a:r>
+          </a:p>
+          <a:p>
+            <a:pPr marL="228600" indent="-228600" algn="r" defTabSz="914400" rtl="1" eaLnBrk="1" latinLnBrk="0" hangingPunct="1">
+              <a:lnSpc>
+                <a:spcPct val="90000"/>
+              </a:lnSpc>
+              <a:spcBef>
+                <a:spcPts val="1000"/>
+              </a:spcBef>
+              <a:buFont typeface="Arial" panose="020B0604020202020204" pitchFamily="34" charset="0"/>
+              <a:buChar char="•"/>
+            </a:pPr>
+            <a:r>
+              <a:rPr lang="ar-SA" dirty="0"/>
+              <a:t>ولا يمكن الوصول إليها إلا داخل البلوك التي تم الإعلان عنها.</a:t>
+            </a:r>
+          </a:p>
+          <a:p>
+            <a:pPr marL="228600" indent="-228600" algn="r" defTabSz="914400" rtl="1" eaLnBrk="1" latinLnBrk="0" hangingPunct="1">
+              <a:lnSpc>
+                <a:spcPct val="90000"/>
+              </a:lnSpc>
+              <a:spcBef>
+                <a:spcPts val="1000"/>
+              </a:spcBef>
+              <a:buFont typeface="Arial" panose="020B0604020202020204" pitchFamily="34" charset="0"/>
+              <a:buChar char="•"/>
+            </a:pPr>
+            <a:r>
+              <a:rPr lang="ar-SA" dirty="0"/>
+              <a:t>يتم تدميره بمجرد اكتمال تنفيذ البلوك.</a:t>
+            </a:r>
+          </a:p>
+          <a:p>
+            <a:pPr marL="228600" indent="-228600" algn="r" defTabSz="914400" rtl="1" eaLnBrk="1" latinLnBrk="0" hangingPunct="1">
+              <a:lnSpc>
+                <a:spcPct val="90000"/>
+              </a:lnSpc>
+              <a:spcBef>
+                <a:spcPts val="1000"/>
+              </a:spcBef>
+              <a:buFont typeface="Arial" panose="020B0604020202020204" pitchFamily="34" charset="0"/>
+              <a:buChar char="•"/>
+            </a:pPr>
+            <a:endParaRPr lang="en-TR" dirty="0"/>
+          </a:p>
+        </p:txBody>
+      </p:sp>
+      <p:pic>
+        <p:nvPicPr>
+          <p:cNvPr id="5" name="Picture 4" descr="A screen shot of a computer&#10;&#10;Description automatically generated">
+            <a:extLst>
+              <a:ext uri="{FF2B5EF4-FFF2-40B4-BE49-F238E27FC236}">
+                <a16:creationId xmlns:a16="http://schemas.microsoft.com/office/drawing/2014/main" id="{B8F13BA4-5130-08FF-C5E8-E3B44E53A510}"/>
+              </a:ext>
+            </a:extLst>
+          </p:cNvPr>
+          <p:cNvPicPr>
+            <a:picLocks noChangeAspect="1"/>
+          </p:cNvPicPr>
+          <p:nvPr/>
+        </p:nvPicPr>
+        <p:blipFill>
+          <a:blip r:embed="rId2"/>
+          <a:stretch>
+            <a:fillRect/>
+          </a:stretch>
+        </p:blipFill>
+        <p:spPr>
+          <a:xfrm>
+            <a:off x="685800" y="4206622"/>
+            <a:ext cx="7683500" cy="1676400"/>
+          </a:xfrm>
+          <a:prstGeom prst="rect">
+            <a:avLst/>
+          </a:prstGeom>
+        </p:spPr>
+      </p:pic>
+    </p:spTree>
+    <p:extLst>
+      <p:ext uri="{BB962C8B-B14F-4D97-AF65-F5344CB8AC3E}">
+        <p14:creationId xmlns:p14="http://schemas.microsoft.com/office/powerpoint/2010/main" val="2641186473"/>
+      </p:ext>
+    </p:extLst>
+  </p:cSld>
+  <p:clrMapOvr>
+    <a:masterClrMapping/>
+  </p:clrMapOvr>
+</p:sld>
+</file>
+
+<file path=ppt/slides/slide11.xml><?xml version="1.0" encoding="utf-8"?>
+<p:sld xmlns:a="http://schemas.openxmlformats.org/drawingml/2006/main" xmlns:r="http://schemas.openxmlformats.org/officeDocument/2006/relationships" xmlns:p="http://schemas.openxmlformats.org/presentationml/2006/main">
+  <p:cSld>
+    <p:spTree>
+      <p:nvGrpSpPr>
+        <p:cNvPr id="1" name=""/>
+        <p:cNvGrpSpPr/>
+        <p:nvPr/>
+      </p:nvGrpSpPr>
+      <p:grpSpPr>
+        <a:xfrm>
+          <a:off x="0" y="0"/>
+          <a:ext cx="0" cy="0"/>
+          <a:chOff x="0" y="0"/>
+          <a:chExt cx="0" cy="0"/>
+        </a:xfrm>
+      </p:grpSpPr>
+      <p:sp>
+        <p:nvSpPr>
+          <p:cNvPr id="2" name="Title 1">
+            <a:extLst>
+              <a:ext uri="{FF2B5EF4-FFF2-40B4-BE49-F238E27FC236}">
+                <a16:creationId xmlns:a16="http://schemas.microsoft.com/office/drawing/2014/main" id="{BDCCDCB9-24BC-664A-280D-BE7D2093BBBA}"/>
+              </a:ext>
+            </a:extLst>
+          </p:cNvPr>
+          <p:cNvSpPr>
+            <a:spLocks noGrp="1"/>
+          </p:cNvSpPr>
+          <p:nvPr>
+            <p:ph type="title"/>
+          </p:nvPr>
+        </p:nvSpPr>
+        <p:spPr/>
+        <p:txBody>
+          <a:bodyPr/>
+          <a:lstStyle/>
+          <a:p>
+            <a:r>
+              <a:rPr lang="ar-SA" dirty="0"/>
+              <a:t>المجال المعجمي</a:t>
+            </a:r>
+            <a:endParaRPr lang="en-TR" dirty="0"/>
+          </a:p>
+        </p:txBody>
+      </p:sp>
+      <p:sp>
+        <p:nvSpPr>
+          <p:cNvPr id="3" name="Content Placeholder 2">
+            <a:extLst>
+              <a:ext uri="{FF2B5EF4-FFF2-40B4-BE49-F238E27FC236}">
+                <a16:creationId xmlns:a16="http://schemas.microsoft.com/office/drawing/2014/main" id="{2C4F8140-281F-B84F-648E-515D0B7BAD69}"/>
+              </a:ext>
+            </a:extLst>
+          </p:cNvPr>
+          <p:cNvSpPr>
+            <a:spLocks noGrp="1"/>
+          </p:cNvSpPr>
+          <p:nvPr>
+            <p:ph idx="1"/>
+          </p:nvPr>
+        </p:nvSpPr>
+        <p:spPr/>
+        <p:txBody>
+          <a:bodyPr/>
+          <a:lstStyle/>
+          <a:p>
+            <a:pPr marL="228600" indent="-228600" algn="r" defTabSz="914400" rtl="1" eaLnBrk="1" latinLnBrk="0" hangingPunct="1">
+              <a:lnSpc>
+                <a:spcPct val="90000"/>
+              </a:lnSpc>
+              <a:spcBef>
+                <a:spcPts val="1000"/>
+              </a:spcBef>
+              <a:buFont typeface="Arial" panose="020B0604020202020204" pitchFamily="34" charset="0"/>
+              <a:buChar char="•"/>
+            </a:pPr>
+            <a:r>
+              <a:rPr lang="ar-SA" dirty="0"/>
+              <a:t>يشير إلى إمكانية الوصول إلى المتغيرات بناءً على موقعها الفعلي في الكود المكتوب (البيئة المعجمية).</a:t>
+            </a:r>
+          </a:p>
+          <a:p>
+            <a:pPr marL="228600" indent="-228600" algn="r" defTabSz="914400" rtl="1" eaLnBrk="1" latinLnBrk="0" hangingPunct="1">
+              <a:lnSpc>
+                <a:spcPct val="90000"/>
+              </a:lnSpc>
+              <a:spcBef>
+                <a:spcPts val="1000"/>
+              </a:spcBef>
+              <a:buFont typeface="Arial" panose="020B0604020202020204" pitchFamily="34" charset="0"/>
+              <a:buChar char="•"/>
+            </a:pPr>
+            <a:r>
+              <a:rPr lang="ar-SA" dirty="0"/>
+              <a:t>يمكن للدوال الداخلية الوصول إلى المتغيرات من دوالها الخارجية، ولكن ليس العكس.</a:t>
+            </a:r>
+          </a:p>
+          <a:p>
+            <a:pPr marL="228600" indent="-228600" algn="r" defTabSz="914400" rtl="1" eaLnBrk="1" latinLnBrk="0" hangingPunct="1">
+              <a:lnSpc>
+                <a:spcPct val="90000"/>
+              </a:lnSpc>
+              <a:spcBef>
+                <a:spcPts val="1000"/>
+              </a:spcBef>
+              <a:buFont typeface="Arial" panose="020B0604020202020204" pitchFamily="34" charset="0"/>
+              <a:buChar char="•"/>
+            </a:pPr>
+            <a:endParaRPr lang="en-TR" dirty="0"/>
+          </a:p>
+        </p:txBody>
+      </p:sp>
+      <p:pic>
+        <p:nvPicPr>
+          <p:cNvPr id="5" name="Picture 4" descr="A screen shot of a computer screen&#10;&#10;Description automatically generated">
+            <a:extLst>
+              <a:ext uri="{FF2B5EF4-FFF2-40B4-BE49-F238E27FC236}">
+                <a16:creationId xmlns:a16="http://schemas.microsoft.com/office/drawing/2014/main" id="{2519AC79-8272-96A4-0E8A-AB24E50C2872}"/>
+              </a:ext>
+            </a:extLst>
+          </p:cNvPr>
+          <p:cNvPicPr>
+            <a:picLocks noChangeAspect="1"/>
+          </p:cNvPicPr>
+          <p:nvPr/>
+        </p:nvPicPr>
+        <p:blipFill>
+          <a:blip r:embed="rId2"/>
+          <a:stretch>
+            <a:fillRect/>
+          </a:stretch>
+        </p:blipFill>
+        <p:spPr>
+          <a:xfrm>
+            <a:off x="322419" y="3202278"/>
+            <a:ext cx="7683500" cy="3467100"/>
+          </a:xfrm>
+          <a:prstGeom prst="rect">
+            <a:avLst/>
+          </a:prstGeom>
+        </p:spPr>
+      </p:pic>
+    </p:spTree>
+    <p:extLst>
+      <p:ext uri="{BB962C8B-B14F-4D97-AF65-F5344CB8AC3E}">
+        <p14:creationId xmlns:p14="http://schemas.microsoft.com/office/powerpoint/2010/main" val="2707681181"/>
+      </p:ext>
+    </p:extLst>
+  </p:cSld>
+  <p:clrMapOvr>
+    <a:masterClrMapping/>
+  </p:clrMapOvr>
+</p:sld>
+</file>
+
+<file path=ppt/slides/slide12.xml><?xml version="1.0" encoding="utf-8"?>
+<p:sld xmlns:a="http://schemas.openxmlformats.org/drawingml/2006/main" xmlns:r="http://schemas.openxmlformats.org/officeDocument/2006/relationships" xmlns:p="http://schemas.openxmlformats.org/presentationml/2006/main">
+  <p:cSld>
+    <p:spTree>
+      <p:nvGrpSpPr>
+        <p:cNvPr id="1" name=""/>
+        <p:cNvGrpSpPr/>
+        <p:nvPr/>
+      </p:nvGrpSpPr>
+      <p:grpSpPr>
+        <a:xfrm>
+          <a:off x="0" y="0"/>
+          <a:ext cx="0" cy="0"/>
+          <a:chOff x="0" y="0"/>
+          <a:chExt cx="0" cy="0"/>
+        </a:xfrm>
+      </p:grpSpPr>
+      <p:sp>
+        <p:nvSpPr>
+          <p:cNvPr id="2" name="Title 1">
+            <a:extLst>
+              <a:ext uri="{FF2B5EF4-FFF2-40B4-BE49-F238E27FC236}">
+                <a16:creationId xmlns:a16="http://schemas.microsoft.com/office/drawing/2014/main" id="{C4F88D5C-A309-554B-705E-AFAC8F5B55E6}"/>
+              </a:ext>
+            </a:extLst>
+          </p:cNvPr>
+          <p:cNvSpPr>
+            <a:spLocks noGrp="1"/>
+          </p:cNvSpPr>
+          <p:nvPr>
+            <p:ph type="title"/>
+          </p:nvPr>
+        </p:nvSpPr>
+        <p:spPr/>
+        <p:txBody>
+          <a:bodyPr/>
+          <a:lstStyle/>
+          <a:p>
+            <a:r>
+              <a:rPr lang="ar-SA" dirty="0"/>
+              <a:t>الرفع</a:t>
+            </a:r>
+            <a:r>
+              <a:rPr lang="en-US" dirty="0"/>
+              <a:t> Hoisting</a:t>
+            </a:r>
+            <a:endParaRPr lang="en-TR" dirty="0"/>
+          </a:p>
+        </p:txBody>
+      </p:sp>
+      <p:sp>
+        <p:nvSpPr>
+          <p:cNvPr id="3" name="Content Placeholder 2">
+            <a:extLst>
+              <a:ext uri="{FF2B5EF4-FFF2-40B4-BE49-F238E27FC236}">
+                <a16:creationId xmlns:a16="http://schemas.microsoft.com/office/drawing/2014/main" id="{937BF6F7-ABF4-D1B5-46C3-11E21E2D71AD}"/>
+              </a:ext>
+            </a:extLst>
+          </p:cNvPr>
+          <p:cNvSpPr>
+            <a:spLocks noGrp="1"/>
+          </p:cNvSpPr>
+          <p:nvPr>
+            <p:ph idx="1"/>
+          </p:nvPr>
+        </p:nvSpPr>
+        <p:spPr/>
+        <p:txBody>
+          <a:bodyPr/>
+          <a:lstStyle/>
+          <a:p>
+            <a:pPr marL="228600" indent="-228600" algn="r" defTabSz="914400" rtl="1" eaLnBrk="1" latinLnBrk="0" hangingPunct="1">
+              <a:lnSpc>
+                <a:spcPct val="90000"/>
+              </a:lnSpc>
+              <a:spcBef>
+                <a:spcPts val="1000"/>
+              </a:spcBef>
+              <a:buFont typeface="Arial" panose="020B0604020202020204" pitchFamily="34" charset="0"/>
+              <a:buChar char="•"/>
+            </a:pPr>
+            <a:r>
+              <a:rPr lang="ar-SA" dirty="0"/>
+              <a:t>الرفع في </a:t>
+            </a:r>
+            <a:r>
+              <a:rPr lang="en-US" dirty="0"/>
+              <a:t>JavaScript </a:t>
+            </a:r>
+            <a:r>
+              <a:rPr lang="ar-SA" dirty="0"/>
+              <a:t> هو سلوك يتم فيه نقل إعلانات المتغيرات والوظائف إلى أعلى المجال الذي يحتوي عليها أثناء مرحلة الترجمة. من المهم ملاحظة أنه يتم رفع الإعلانات فقط، وليس عمليات التهيئة (باستثناء إعلانات الدوال).</a:t>
+            </a:r>
+          </a:p>
+          <a:p>
+            <a:pPr marL="228600" indent="-228600" algn="r" defTabSz="914400" rtl="1" eaLnBrk="1" latinLnBrk="0" hangingPunct="1">
+              <a:lnSpc>
+                <a:spcPct val="90000"/>
+              </a:lnSpc>
+              <a:spcBef>
+                <a:spcPts val="1000"/>
+              </a:spcBef>
+              <a:buFont typeface="Arial" panose="020B0604020202020204" pitchFamily="34" charset="0"/>
+              <a:buChar char="•"/>
+            </a:pPr>
+            <a:r>
+              <a:rPr lang="ar-SA" dirty="0"/>
+              <a:t>رفع المتغيرات</a:t>
+            </a:r>
+          </a:p>
+          <a:p>
+            <a:pPr marL="228600" indent="-228600" algn="r" defTabSz="914400" rtl="1" eaLnBrk="1" latinLnBrk="0" hangingPunct="1">
+              <a:lnSpc>
+                <a:spcPct val="90000"/>
+              </a:lnSpc>
+              <a:spcBef>
+                <a:spcPts val="1000"/>
+              </a:spcBef>
+              <a:buFont typeface="Arial" panose="020B0604020202020204" pitchFamily="34" charset="0"/>
+              <a:buChar char="•"/>
+            </a:pPr>
+            <a:r>
+              <a:rPr lang="ar-SA" dirty="0"/>
+              <a:t>رفع الدوال</a:t>
+            </a:r>
+            <a:endParaRPr lang="en-TR" dirty="0"/>
+          </a:p>
+        </p:txBody>
+      </p:sp>
+    </p:spTree>
+    <p:extLst>
+      <p:ext uri="{BB962C8B-B14F-4D97-AF65-F5344CB8AC3E}">
+        <p14:creationId xmlns:p14="http://schemas.microsoft.com/office/powerpoint/2010/main" val="2576802620"/>
+      </p:ext>
+    </p:extLst>
+  </p:cSld>
+  <p:clrMapOvr>
+    <a:masterClrMapping/>
+  </p:clrMapOvr>
+</p:sld>
+</file>
+
+<file path=ppt/slides/slide13.xml><?xml version="1.0" encoding="utf-8"?>
+<p:sld xmlns:a="http://schemas.openxmlformats.org/drawingml/2006/main" xmlns:r="http://schemas.openxmlformats.org/officeDocument/2006/relationships" xmlns:p="http://schemas.openxmlformats.org/presentationml/2006/main">
+  <p:cSld>
+    <p:spTree>
+      <p:nvGrpSpPr>
+        <p:cNvPr id="1" name=""/>
+        <p:cNvGrpSpPr/>
+        <p:nvPr/>
+      </p:nvGrpSpPr>
+      <p:grpSpPr>
+        <a:xfrm>
+          <a:off x="0" y="0"/>
+          <a:ext cx="0" cy="0"/>
+          <a:chOff x="0" y="0"/>
+          <a:chExt cx="0" cy="0"/>
+        </a:xfrm>
+      </p:grpSpPr>
+      <p:sp>
+        <p:nvSpPr>
+          <p:cNvPr id="2" name="Title 1">
+            <a:extLst>
+              <a:ext uri="{FF2B5EF4-FFF2-40B4-BE49-F238E27FC236}">
+                <a16:creationId xmlns:a16="http://schemas.microsoft.com/office/drawing/2014/main" id="{C2D61D85-1F48-9E8A-C057-749F3BE34F7D}"/>
+              </a:ext>
+            </a:extLst>
+          </p:cNvPr>
+          <p:cNvSpPr>
+            <a:spLocks noGrp="1"/>
+          </p:cNvSpPr>
+          <p:nvPr>
+            <p:ph type="title"/>
+          </p:nvPr>
+        </p:nvSpPr>
+        <p:spPr/>
+        <p:txBody>
+          <a:bodyPr/>
+          <a:lstStyle/>
+          <a:p>
+            <a:r>
+              <a:rPr lang="ar-SA" dirty="0"/>
+              <a:t>الكائنات</a:t>
+            </a:r>
+            <a:endParaRPr lang="en-TR" dirty="0"/>
+          </a:p>
+        </p:txBody>
+      </p:sp>
+      <p:sp>
+        <p:nvSpPr>
+          <p:cNvPr id="3" name="Content Placeholder 2">
+            <a:extLst>
+              <a:ext uri="{FF2B5EF4-FFF2-40B4-BE49-F238E27FC236}">
+                <a16:creationId xmlns:a16="http://schemas.microsoft.com/office/drawing/2014/main" id="{895FADF5-F066-E14B-A2E4-813E251F427F}"/>
+              </a:ext>
+            </a:extLst>
+          </p:cNvPr>
+          <p:cNvSpPr>
+            <a:spLocks noGrp="1"/>
+          </p:cNvSpPr>
+          <p:nvPr>
+            <p:ph idx="1"/>
+          </p:nvPr>
+        </p:nvSpPr>
+        <p:spPr/>
+        <p:txBody>
+          <a:bodyPr/>
+          <a:lstStyle/>
+          <a:p>
+            <a:pPr marL="228600" indent="-228600" algn="r" defTabSz="914400" rtl="1" eaLnBrk="1" latinLnBrk="0" hangingPunct="1">
+              <a:lnSpc>
+                <a:spcPct val="90000"/>
+              </a:lnSpc>
+              <a:spcBef>
+                <a:spcPts val="1000"/>
+              </a:spcBef>
+              <a:buFont typeface="Arial" panose="020B0604020202020204" pitchFamily="34" charset="0"/>
+              <a:buChar char="•"/>
+            </a:pPr>
+            <a:r>
+              <a:rPr lang="ar-SA" dirty="0"/>
+              <a:t>صناعة الكائنات </a:t>
+            </a:r>
+          </a:p>
+          <a:p>
+            <a:pPr marL="228600" indent="-228600" algn="r" defTabSz="914400" rtl="1" eaLnBrk="1" latinLnBrk="0" hangingPunct="1">
+              <a:lnSpc>
+                <a:spcPct val="90000"/>
+              </a:lnSpc>
+              <a:spcBef>
+                <a:spcPts val="1000"/>
+              </a:spcBef>
+              <a:buFont typeface="Arial" panose="020B0604020202020204" pitchFamily="34" charset="0"/>
+              <a:buChar char="•"/>
+            </a:pPr>
+            <a:r>
+              <a:rPr lang="en-US" dirty="0"/>
+              <a:t>Object Literal</a:t>
+            </a:r>
+            <a:r>
+              <a:rPr lang="ar-SA" dirty="0"/>
+              <a:t> </a:t>
+            </a:r>
+            <a:r>
+              <a:rPr lang="en-US" dirty="0"/>
+              <a:t>{}</a:t>
+            </a:r>
+          </a:p>
+          <a:p>
+            <a:pPr marL="228600" indent="-228600" algn="r" defTabSz="914400" rtl="1" eaLnBrk="1" latinLnBrk="0" hangingPunct="1">
+              <a:lnSpc>
+                <a:spcPct val="90000"/>
+              </a:lnSpc>
+              <a:spcBef>
+                <a:spcPts val="1000"/>
+              </a:spcBef>
+              <a:buFont typeface="Arial" panose="020B0604020202020204" pitchFamily="34" charset="0"/>
+              <a:buChar char="•"/>
+            </a:pPr>
+            <a:r>
+              <a:rPr lang="ar-SA" dirty="0"/>
+              <a:t>الدوال البانية</a:t>
+            </a:r>
+            <a:r>
+              <a:rPr lang="en-US" dirty="0"/>
+              <a:t>  </a:t>
+            </a:r>
+            <a:r>
+              <a:rPr lang="ar-SA" dirty="0"/>
+              <a:t> </a:t>
+            </a:r>
+            <a:r>
+              <a:rPr lang="en-US" dirty="0"/>
+              <a:t>constructor functions</a:t>
+            </a:r>
+            <a:endParaRPr lang="ar-SA" dirty="0"/>
+          </a:p>
+          <a:p>
+            <a:pPr marL="228600" indent="-228600" algn="r" defTabSz="914400" rtl="1" eaLnBrk="1" latinLnBrk="0" hangingPunct="1">
+              <a:lnSpc>
+                <a:spcPct val="90000"/>
+              </a:lnSpc>
+              <a:spcBef>
+                <a:spcPts val="1000"/>
+              </a:spcBef>
+              <a:buFont typeface="Arial" panose="020B0604020202020204" pitchFamily="34" charset="0"/>
+              <a:buChar char="•"/>
+            </a:pPr>
+            <a:r>
+              <a:rPr lang="ar-SA" dirty="0"/>
+              <a:t>الدوال المصنعة</a:t>
+            </a:r>
+            <a:r>
+              <a:rPr lang="tr-TR" dirty="0"/>
+              <a:t> </a:t>
+            </a:r>
+            <a:r>
+              <a:rPr lang="ar-SA" dirty="0"/>
+              <a:t> </a:t>
+            </a:r>
+            <a:r>
+              <a:rPr lang="en-US" dirty="0"/>
+              <a:t>factory functions</a:t>
+            </a:r>
+            <a:endParaRPr lang="ar-SA" dirty="0"/>
+          </a:p>
+          <a:p>
+            <a:pPr marL="228600" indent="-228600" algn="r" defTabSz="914400" rtl="1" eaLnBrk="1" latinLnBrk="0" hangingPunct="1">
+              <a:lnSpc>
+                <a:spcPct val="90000"/>
+              </a:lnSpc>
+              <a:spcBef>
+                <a:spcPts val="1000"/>
+              </a:spcBef>
+              <a:buFont typeface="Arial" panose="020B0604020202020204" pitchFamily="34" charset="0"/>
+              <a:buChar char="•"/>
+            </a:pPr>
+            <a:r>
+              <a:rPr lang="en-US" dirty="0"/>
+              <a:t>class</a:t>
+            </a:r>
+            <a:endParaRPr lang="en-TR" dirty="0"/>
+          </a:p>
+        </p:txBody>
+      </p:sp>
+    </p:spTree>
+    <p:extLst>
+      <p:ext uri="{BB962C8B-B14F-4D97-AF65-F5344CB8AC3E}">
+        <p14:creationId xmlns:p14="http://schemas.microsoft.com/office/powerpoint/2010/main" val="2349570580"/>
+      </p:ext>
+    </p:extLst>
+  </p:cSld>
+  <p:clrMapOvr>
+    <a:masterClrMapping/>
+  </p:clrMapOvr>
+</p:sld>
+</file>
+
+<file path=ppt/slides/slide14.xml><?xml version="1.0" encoding="utf-8"?>
+<p:sld xmlns:a="http://schemas.openxmlformats.org/drawingml/2006/main" xmlns:r="http://schemas.openxmlformats.org/officeDocument/2006/relationships" xmlns:p="http://schemas.openxmlformats.org/presentationml/2006/main">
+  <p:cSld>
+    <p:spTree>
+      <p:nvGrpSpPr>
+        <p:cNvPr id="1" name=""/>
+        <p:cNvGrpSpPr/>
+        <p:nvPr/>
+      </p:nvGrpSpPr>
+      <p:grpSpPr>
+        <a:xfrm>
+          <a:off x="0" y="0"/>
+          <a:ext cx="0" cy="0"/>
+          <a:chOff x="0" y="0"/>
+          <a:chExt cx="0" cy="0"/>
+        </a:xfrm>
+      </p:grpSpPr>
+      <p:sp>
+        <p:nvSpPr>
+          <p:cNvPr id="2" name="Title 1">
+            <a:extLst>
+              <a:ext uri="{FF2B5EF4-FFF2-40B4-BE49-F238E27FC236}">
+                <a16:creationId xmlns:a16="http://schemas.microsoft.com/office/drawing/2014/main" id="{F9B9A19F-EB45-97F1-B110-1F03A5B3526B}"/>
+              </a:ext>
+            </a:extLst>
+          </p:cNvPr>
+          <p:cNvSpPr>
+            <a:spLocks noGrp="1"/>
+          </p:cNvSpPr>
+          <p:nvPr>
+            <p:ph type="title"/>
+          </p:nvPr>
+        </p:nvSpPr>
+        <p:spPr/>
+        <p:txBody>
+          <a:bodyPr/>
+          <a:lstStyle/>
+          <a:p>
+            <a:r>
+              <a:rPr lang="ar-SA" dirty="0"/>
+              <a:t>جميع الكائنات تشترك بما يلي</a:t>
+            </a:r>
+            <a:endParaRPr lang="en-TR" dirty="0"/>
+          </a:p>
+        </p:txBody>
+      </p:sp>
+      <p:sp>
+        <p:nvSpPr>
+          <p:cNvPr id="3" name="Content Placeholder 2">
+            <a:extLst>
+              <a:ext uri="{FF2B5EF4-FFF2-40B4-BE49-F238E27FC236}">
+                <a16:creationId xmlns:a16="http://schemas.microsoft.com/office/drawing/2014/main" id="{027E8964-548C-0F0D-3BE1-D079ED493AF2}"/>
+              </a:ext>
+            </a:extLst>
+          </p:cNvPr>
+          <p:cNvSpPr>
+            <a:spLocks noGrp="1"/>
+          </p:cNvSpPr>
+          <p:nvPr>
+            <p:ph idx="1"/>
+          </p:nvPr>
+        </p:nvSpPr>
+        <p:spPr/>
+        <p:txBody>
+          <a:bodyPr>
+            <a:normAutofit fontScale="70000" lnSpcReduction="20000"/>
+          </a:bodyPr>
+          <a:lstStyle/>
+          <a:p>
+            <a:pPr marL="228600" indent="-228600" algn="r" defTabSz="914400" rtl="1" eaLnBrk="1" latinLnBrk="0" hangingPunct="1">
+              <a:lnSpc>
+                <a:spcPct val="90000"/>
+              </a:lnSpc>
+              <a:spcBef>
+                <a:spcPts val="1000"/>
+              </a:spcBef>
+              <a:buFont typeface="Arial" panose="020B0604020202020204" pitchFamily="34" charset="0"/>
+              <a:buChar char="•"/>
+            </a:pPr>
+            <a:r>
+              <a:rPr lang="en-US" dirty="0"/>
+              <a:t>__</a:t>
+            </a:r>
+            <a:r>
+              <a:rPr lang="en-US" dirty="0" err="1"/>
+              <a:t>defineGetter</a:t>
+            </a:r>
+            <a:r>
+              <a:rPr lang="en-US" dirty="0"/>
+              <a:t>__</a:t>
+            </a:r>
+          </a:p>
+          <a:p>
+            <a:pPr marL="228600" indent="-228600" algn="r" defTabSz="914400" rtl="1" eaLnBrk="1" latinLnBrk="0" hangingPunct="1">
+              <a:lnSpc>
+                <a:spcPct val="90000"/>
+              </a:lnSpc>
+              <a:spcBef>
+                <a:spcPts val="1000"/>
+              </a:spcBef>
+              <a:buFont typeface="Arial" panose="020B0604020202020204" pitchFamily="34" charset="0"/>
+              <a:buChar char="•"/>
+            </a:pPr>
+            <a:r>
+              <a:rPr lang="en-US" dirty="0"/>
+              <a:t>__</a:t>
+            </a:r>
+            <a:r>
+              <a:rPr lang="en-US" dirty="0" err="1"/>
+              <a:t>defineSetter</a:t>
+            </a:r>
+            <a:r>
+              <a:rPr lang="en-US" dirty="0"/>
+              <a:t>__</a:t>
+            </a:r>
+          </a:p>
+          <a:p>
+            <a:pPr marL="228600" indent="-228600" algn="r" defTabSz="914400" rtl="1" eaLnBrk="1" latinLnBrk="0" hangingPunct="1">
+              <a:lnSpc>
+                <a:spcPct val="90000"/>
+              </a:lnSpc>
+              <a:spcBef>
+                <a:spcPts val="1000"/>
+              </a:spcBef>
+              <a:buFont typeface="Arial" panose="020B0604020202020204" pitchFamily="34" charset="0"/>
+              <a:buChar char="•"/>
+            </a:pPr>
+            <a:r>
+              <a:rPr lang="en-US" dirty="0"/>
+              <a:t>__</a:t>
+            </a:r>
+            <a:r>
+              <a:rPr lang="en-US" dirty="0" err="1"/>
+              <a:t>lookupGetter</a:t>
+            </a:r>
+            <a:r>
+              <a:rPr lang="en-US" dirty="0"/>
+              <a:t>__</a:t>
+            </a:r>
+          </a:p>
+          <a:p>
+            <a:pPr marL="228600" indent="-228600" algn="r" defTabSz="914400" rtl="1" eaLnBrk="1" latinLnBrk="0" hangingPunct="1">
+              <a:lnSpc>
+                <a:spcPct val="90000"/>
+              </a:lnSpc>
+              <a:spcBef>
+                <a:spcPts val="1000"/>
+              </a:spcBef>
+              <a:buFont typeface="Arial" panose="020B0604020202020204" pitchFamily="34" charset="0"/>
+              <a:buChar char="•"/>
+            </a:pPr>
+            <a:r>
+              <a:rPr lang="en-US" dirty="0"/>
+              <a:t>__</a:t>
+            </a:r>
+            <a:r>
+              <a:rPr lang="en-US" dirty="0" err="1"/>
+              <a:t>lookupSetter</a:t>
+            </a:r>
+            <a:r>
+              <a:rPr lang="en-US" dirty="0"/>
+              <a:t>__</a:t>
+            </a:r>
+          </a:p>
+          <a:p>
+            <a:pPr marL="228600" indent="-228600" algn="r" defTabSz="914400" rtl="1" eaLnBrk="1" latinLnBrk="0" hangingPunct="1">
+              <a:lnSpc>
+                <a:spcPct val="90000"/>
+              </a:lnSpc>
+              <a:spcBef>
+                <a:spcPts val="1000"/>
+              </a:spcBef>
+              <a:buFont typeface="Arial" panose="020B0604020202020204" pitchFamily="34" charset="0"/>
+              <a:buChar char="•"/>
+            </a:pPr>
+            <a:r>
+              <a:rPr lang="en-US" dirty="0"/>
+              <a:t>__proto__</a:t>
+            </a:r>
+          </a:p>
+          <a:p>
+            <a:pPr marL="228600" indent="-228600" algn="r" defTabSz="914400" rtl="1" eaLnBrk="1" latinLnBrk="0" hangingPunct="1">
+              <a:lnSpc>
+                <a:spcPct val="90000"/>
+              </a:lnSpc>
+              <a:spcBef>
+                <a:spcPts val="1000"/>
+              </a:spcBef>
+              <a:buFont typeface="Arial" panose="020B0604020202020204" pitchFamily="34" charset="0"/>
+              <a:buChar char="•"/>
+            </a:pPr>
+            <a:r>
+              <a:rPr lang="en-US" dirty="0"/>
+              <a:t>city</a:t>
+            </a:r>
+          </a:p>
+          <a:p>
+            <a:pPr marL="228600" indent="-228600" algn="r" defTabSz="914400" rtl="1" eaLnBrk="1" latinLnBrk="0" hangingPunct="1">
+              <a:lnSpc>
+                <a:spcPct val="90000"/>
+              </a:lnSpc>
+              <a:spcBef>
+                <a:spcPts val="1000"/>
+              </a:spcBef>
+              <a:buFont typeface="Arial" panose="020B0604020202020204" pitchFamily="34" charset="0"/>
+              <a:buChar char="•"/>
+            </a:pPr>
+            <a:r>
+              <a:rPr lang="en-US" dirty="0"/>
+              <a:t>constructor</a:t>
+            </a:r>
+          </a:p>
+          <a:p>
+            <a:pPr marL="228600" indent="-228600" algn="r" defTabSz="914400" rtl="1" eaLnBrk="1" latinLnBrk="0" hangingPunct="1">
+              <a:lnSpc>
+                <a:spcPct val="90000"/>
+              </a:lnSpc>
+              <a:spcBef>
+                <a:spcPts val="1000"/>
+              </a:spcBef>
+              <a:buFont typeface="Arial" panose="020B0604020202020204" pitchFamily="34" charset="0"/>
+              <a:buChar char="•"/>
+            </a:pPr>
+            <a:r>
+              <a:rPr lang="en-US" dirty="0"/>
+              <a:t>greet</a:t>
+            </a:r>
+          </a:p>
+          <a:p>
+            <a:pPr marL="228600" indent="-228600" algn="r" defTabSz="914400" rtl="1" eaLnBrk="1" latinLnBrk="0" hangingPunct="1">
+              <a:lnSpc>
+                <a:spcPct val="90000"/>
+              </a:lnSpc>
+              <a:spcBef>
+                <a:spcPts val="1000"/>
+              </a:spcBef>
+              <a:buFont typeface="Arial" panose="020B0604020202020204" pitchFamily="34" charset="0"/>
+              <a:buChar char="•"/>
+            </a:pPr>
+            <a:r>
+              <a:rPr lang="en-US" dirty="0" err="1"/>
+              <a:t>hasOwnProperty</a:t>
+            </a:r>
+            <a:endParaRPr lang="en-US" dirty="0"/>
+          </a:p>
+          <a:p>
+            <a:pPr marL="228600" indent="-228600" algn="r" defTabSz="914400" rtl="1" eaLnBrk="1" latinLnBrk="0" hangingPunct="1">
+              <a:lnSpc>
+                <a:spcPct val="90000"/>
+              </a:lnSpc>
+              <a:spcBef>
+                <a:spcPts val="1000"/>
+              </a:spcBef>
+              <a:buFont typeface="Arial" panose="020B0604020202020204" pitchFamily="34" charset="0"/>
+              <a:buChar char="•"/>
+            </a:pPr>
+            <a:r>
+              <a:rPr lang="en-US" dirty="0" err="1"/>
+              <a:t>isPrototypeOf</a:t>
+            </a:r>
+            <a:endParaRPr lang="en-US" dirty="0"/>
+          </a:p>
+          <a:p>
+            <a:pPr marL="228600" indent="-228600" algn="r" defTabSz="914400" rtl="1" eaLnBrk="1" latinLnBrk="0" hangingPunct="1">
+              <a:lnSpc>
+                <a:spcPct val="90000"/>
+              </a:lnSpc>
+              <a:spcBef>
+                <a:spcPts val="1000"/>
+              </a:spcBef>
+              <a:buFont typeface="Arial" panose="020B0604020202020204" pitchFamily="34" charset="0"/>
+              <a:buChar char="•"/>
+            </a:pPr>
+            <a:r>
+              <a:rPr lang="en-US" dirty="0" err="1"/>
+              <a:t>propertyIsEnumerable</a:t>
+            </a:r>
+            <a:endParaRPr lang="en-US" dirty="0"/>
+          </a:p>
+          <a:p>
+            <a:pPr marL="228600" indent="-228600" algn="r" defTabSz="914400" rtl="1" eaLnBrk="1" latinLnBrk="0" hangingPunct="1">
+              <a:lnSpc>
+                <a:spcPct val="90000"/>
+              </a:lnSpc>
+              <a:spcBef>
+                <a:spcPts val="1000"/>
+              </a:spcBef>
+              <a:buFont typeface="Arial" panose="020B0604020202020204" pitchFamily="34" charset="0"/>
+              <a:buChar char="•"/>
+            </a:pPr>
+            <a:r>
+              <a:rPr lang="en-US" dirty="0" err="1"/>
+              <a:t>toLocaleString</a:t>
+            </a:r>
+            <a:endParaRPr lang="en-US" dirty="0"/>
+          </a:p>
+          <a:p>
+            <a:pPr marL="228600" indent="-228600" algn="r" defTabSz="914400" rtl="1" eaLnBrk="1" latinLnBrk="0" hangingPunct="1">
+              <a:lnSpc>
+                <a:spcPct val="90000"/>
+              </a:lnSpc>
+              <a:spcBef>
+                <a:spcPts val="1000"/>
+              </a:spcBef>
+              <a:buFont typeface="Arial" panose="020B0604020202020204" pitchFamily="34" charset="0"/>
+              <a:buChar char="•"/>
+            </a:pPr>
+            <a:r>
+              <a:rPr lang="en-US" dirty="0" err="1"/>
+              <a:t>toString</a:t>
+            </a:r>
+            <a:endParaRPr lang="en-US" dirty="0"/>
+          </a:p>
+          <a:p>
+            <a:pPr marL="228600" indent="-228600" algn="r" defTabSz="914400" rtl="1" eaLnBrk="1" latinLnBrk="0" hangingPunct="1">
+              <a:lnSpc>
+                <a:spcPct val="90000"/>
+              </a:lnSpc>
+              <a:spcBef>
+                <a:spcPts val="1000"/>
+              </a:spcBef>
+              <a:buFont typeface="Arial" panose="020B0604020202020204" pitchFamily="34" charset="0"/>
+              <a:buChar char="•"/>
+            </a:pPr>
+            <a:r>
+              <a:rPr lang="en-US" dirty="0" err="1"/>
+              <a:t>valueOf</a:t>
+            </a:r>
+            <a:endParaRPr lang="en-TR" dirty="0"/>
+          </a:p>
+        </p:txBody>
+      </p:sp>
+    </p:spTree>
+    <p:extLst>
+      <p:ext uri="{BB962C8B-B14F-4D97-AF65-F5344CB8AC3E}">
+        <p14:creationId xmlns:p14="http://schemas.microsoft.com/office/powerpoint/2010/main" val="3834515427"/>
+      </p:ext>
+    </p:extLst>
+  </p:cSld>
+  <p:clrMapOvr>
+    <a:masterClrMapping/>
+  </p:clrMapOvr>
+</p:sld>
+</file>
+
+<file path=ppt/slides/slide15.xml><?xml version="1.0" encoding="utf-8"?>
+<p:sld xmlns:a="http://schemas.openxmlformats.org/drawingml/2006/main" xmlns:r="http://schemas.openxmlformats.org/officeDocument/2006/relationships" xmlns:p="http://schemas.openxmlformats.org/presentationml/2006/main">
+  <p:cSld>
+    <p:spTree>
+      <p:nvGrpSpPr>
+        <p:cNvPr id="1" name=""/>
+        <p:cNvGrpSpPr/>
+        <p:nvPr/>
+      </p:nvGrpSpPr>
+      <p:grpSpPr>
+        <a:xfrm>
+          <a:off x="0" y="0"/>
+          <a:ext cx="0" cy="0"/>
+          <a:chOff x="0" y="0"/>
+          <a:chExt cx="0" cy="0"/>
+        </a:xfrm>
+      </p:grpSpPr>
+      <p:sp>
+        <p:nvSpPr>
+          <p:cNvPr id="2" name="Title 1">
+            <a:extLst>
+              <a:ext uri="{FF2B5EF4-FFF2-40B4-BE49-F238E27FC236}">
+                <a16:creationId xmlns:a16="http://schemas.microsoft.com/office/drawing/2014/main" id="{EBF21395-AF9F-7AD5-2E49-991CE2798DF9}"/>
+              </a:ext>
+            </a:extLst>
+          </p:cNvPr>
+          <p:cNvSpPr>
+            <a:spLocks noGrp="1"/>
+          </p:cNvSpPr>
+          <p:nvPr>
+            <p:ph type="title"/>
+          </p:nvPr>
+        </p:nvSpPr>
+        <p:spPr/>
+        <p:txBody>
+          <a:bodyPr/>
+          <a:lstStyle/>
+          <a:p>
+            <a:r>
+              <a:rPr lang="ar-SA" dirty="0"/>
+              <a:t>طبيعة الكائنات في جافا سكربت</a:t>
+            </a:r>
+            <a:endParaRPr lang="en-TR" dirty="0"/>
+          </a:p>
+        </p:txBody>
+      </p:sp>
+      <p:sp>
+        <p:nvSpPr>
+          <p:cNvPr id="3" name="Content Placeholder 2">
+            <a:extLst>
+              <a:ext uri="{FF2B5EF4-FFF2-40B4-BE49-F238E27FC236}">
+                <a16:creationId xmlns:a16="http://schemas.microsoft.com/office/drawing/2014/main" id="{31B53DE7-297A-C09B-A5E2-0EF4610116BA}"/>
+              </a:ext>
+            </a:extLst>
+          </p:cNvPr>
+          <p:cNvSpPr>
+            <a:spLocks noGrp="1"/>
+          </p:cNvSpPr>
+          <p:nvPr>
+            <p:ph idx="1"/>
+          </p:nvPr>
+        </p:nvSpPr>
+        <p:spPr/>
+        <p:txBody>
+          <a:bodyPr/>
+          <a:lstStyle/>
+          <a:p>
+            <a:pPr marL="228600" indent="-228600" algn="r" defTabSz="914400" rtl="1" eaLnBrk="1" latinLnBrk="0" hangingPunct="1">
+              <a:lnSpc>
+                <a:spcPct val="90000"/>
+              </a:lnSpc>
+              <a:spcBef>
+                <a:spcPts val="1000"/>
+              </a:spcBef>
+              <a:buFont typeface="Arial" panose="020B0604020202020204" pitchFamily="34" charset="0"/>
+              <a:buChar char="•"/>
+            </a:pPr>
+            <a:r>
+              <a:rPr lang="ar-SA" dirty="0"/>
+              <a:t>جميع الكائنات يتم بناؤها عن طريق ال </a:t>
+            </a:r>
+            <a:r>
+              <a:rPr lang="en-US" dirty="0"/>
+              <a:t>constructor functions</a:t>
+            </a:r>
+          </a:p>
+          <a:p>
+            <a:pPr marL="228600" indent="-228600" algn="r" defTabSz="914400" rtl="1" eaLnBrk="1" latinLnBrk="0" hangingPunct="1">
+              <a:lnSpc>
+                <a:spcPct val="90000"/>
+              </a:lnSpc>
+              <a:spcBef>
+                <a:spcPts val="1000"/>
+              </a:spcBef>
+              <a:buFont typeface="Arial" panose="020B0604020202020204" pitchFamily="34" charset="0"/>
+              <a:buChar char="•"/>
+            </a:pPr>
+            <a:r>
+              <a:rPr lang="ar-SA" dirty="0"/>
+              <a:t>كل الدوال هي بالفعل كائنات في نهاية الأمر</a:t>
+            </a:r>
+          </a:p>
+          <a:p>
+            <a:pPr marL="228600" indent="-228600" algn="r" defTabSz="914400" rtl="1" eaLnBrk="1" latinLnBrk="0" hangingPunct="1">
+              <a:lnSpc>
+                <a:spcPct val="90000"/>
+              </a:lnSpc>
+              <a:spcBef>
+                <a:spcPts val="1000"/>
+              </a:spcBef>
+              <a:buFont typeface="Arial" panose="020B0604020202020204" pitchFamily="34" charset="0"/>
+              <a:buChar char="•"/>
+            </a:pPr>
+            <a:r>
+              <a:rPr lang="ar-SA" dirty="0"/>
+              <a:t>الدالة </a:t>
+            </a:r>
+            <a:r>
+              <a:rPr lang="en-US" dirty="0"/>
+              <a:t>Object</a:t>
+            </a:r>
+            <a:r>
+              <a:rPr lang="ar-SA" dirty="0"/>
+              <a:t> هي الدالة الرئيسية لصناعة الكائنات في جافا سكربت والكائن </a:t>
+            </a:r>
+            <a:r>
+              <a:rPr lang="en-US" dirty="0" err="1"/>
+              <a:t>Object.prototype</a:t>
+            </a:r>
+            <a:r>
+              <a:rPr lang="ar-SA" dirty="0"/>
+              <a:t> يتربع على هرم الكائنات.</a:t>
+            </a:r>
+          </a:p>
+          <a:p>
+            <a:pPr marL="228600" indent="-228600" algn="r" defTabSz="914400" rtl="1" eaLnBrk="1" latinLnBrk="0" hangingPunct="1">
+              <a:lnSpc>
+                <a:spcPct val="90000"/>
+              </a:lnSpc>
+              <a:spcBef>
+                <a:spcPts val="1000"/>
+              </a:spcBef>
+              <a:buFont typeface="Arial" panose="020B0604020202020204" pitchFamily="34" charset="0"/>
+              <a:buChar char="•"/>
+            </a:pPr>
+            <a:r>
+              <a:rPr lang="en-US" dirty="0" err="1"/>
+              <a:t>Car.prototype</a:t>
+            </a:r>
+            <a:endParaRPr lang="en-US" dirty="0"/>
+          </a:p>
+          <a:p>
+            <a:pPr marL="228600" indent="-228600" algn="r" defTabSz="914400" rtl="1" eaLnBrk="1" latinLnBrk="0" hangingPunct="1">
+              <a:lnSpc>
+                <a:spcPct val="90000"/>
+              </a:lnSpc>
+              <a:spcBef>
+                <a:spcPts val="1000"/>
+              </a:spcBef>
+              <a:buFont typeface="Arial" panose="020B0604020202020204" pitchFamily="34" charset="0"/>
+              <a:buChar char="•"/>
+            </a:pPr>
+            <a:r>
+              <a:rPr lang="en-US" dirty="0" err="1"/>
+              <a:t>Car.__proto</a:t>
+            </a:r>
+            <a:r>
+              <a:rPr lang="en-US" dirty="0"/>
+              <a:t>__</a:t>
+            </a:r>
+          </a:p>
+          <a:p>
+            <a:pPr marL="228600" indent="-228600" algn="r" defTabSz="914400" rtl="1" eaLnBrk="1" latinLnBrk="0" hangingPunct="1">
+              <a:lnSpc>
+                <a:spcPct val="90000"/>
+              </a:lnSpc>
+              <a:spcBef>
+                <a:spcPts val="1000"/>
+              </a:spcBef>
+              <a:buFont typeface="Arial" panose="020B0604020202020204" pitchFamily="34" charset="0"/>
+              <a:buChar char="•"/>
+            </a:pPr>
+            <a:r>
+              <a:rPr lang="en-US" dirty="0" err="1"/>
+              <a:t>Car.prototype.constructor</a:t>
+            </a:r>
+            <a:endParaRPr lang="en-US" dirty="0"/>
+          </a:p>
+          <a:p>
+            <a:pPr marL="228600" indent="-228600" algn="r" defTabSz="914400" rtl="1" eaLnBrk="1" latinLnBrk="0" hangingPunct="1">
+              <a:lnSpc>
+                <a:spcPct val="90000"/>
+              </a:lnSpc>
+              <a:spcBef>
+                <a:spcPts val="1000"/>
+              </a:spcBef>
+              <a:buFont typeface="Arial" panose="020B0604020202020204" pitchFamily="34" charset="0"/>
+              <a:buChar char="•"/>
+            </a:pPr>
+            <a:r>
+              <a:rPr lang="en-US" dirty="0" err="1"/>
+              <a:t>Car.prototype.__proto</a:t>
+            </a:r>
+            <a:endParaRPr lang="ar-SA" dirty="0"/>
+          </a:p>
+        </p:txBody>
+      </p:sp>
+    </p:spTree>
+    <p:extLst>
+      <p:ext uri="{BB962C8B-B14F-4D97-AF65-F5344CB8AC3E}">
+        <p14:creationId xmlns:p14="http://schemas.microsoft.com/office/powerpoint/2010/main" val="4182919077"/>
+      </p:ext>
+    </p:extLst>
+  </p:cSld>
+  <p:clrMapOvr>
+    <a:masterClrMapping/>
+  </p:clrMapOvr>
+</p:sld>
+</file>
+
+<file path=ppt/slides/slide16.xml><?xml version="1.0" encoding="utf-8"?>
+<p:sld xmlns:a="http://schemas.openxmlformats.org/drawingml/2006/main" xmlns:r="http://schemas.openxmlformats.org/officeDocument/2006/relationships" xmlns:p="http://schemas.openxmlformats.org/presentationml/2006/main">
+  <p:cSld>
+    <p:spTree>
+      <p:nvGrpSpPr>
+        <p:cNvPr id="1" name=""/>
+        <p:cNvGrpSpPr/>
+        <p:nvPr/>
+      </p:nvGrpSpPr>
+      <p:grpSpPr>
+        <a:xfrm>
+          <a:off x="0" y="0"/>
+          <a:ext cx="0" cy="0"/>
+          <a:chOff x="0" y="0"/>
+          <a:chExt cx="0" cy="0"/>
+        </a:xfrm>
+      </p:grpSpPr>
+      <p:sp>
+        <p:nvSpPr>
+          <p:cNvPr id="2" name="Title 1">
+            <a:extLst>
+              <a:ext uri="{FF2B5EF4-FFF2-40B4-BE49-F238E27FC236}">
                 <a16:creationId xmlns:a16="http://schemas.microsoft.com/office/drawing/2014/main" id="{CDB06F28-3F12-0DE3-A95B-804CC1CAAEBD}"/>
               </a:ext>
             </a:extLst>
@@ -7210,7 +8501,7 @@
           <p:cNvPr id="2" name="Title 1">
             <a:extLst>
               <a:ext uri="{FF2B5EF4-FFF2-40B4-BE49-F238E27FC236}">
-                <a16:creationId xmlns:a16="http://schemas.microsoft.com/office/drawing/2014/main" id="{C2D61D85-1F48-9E8A-C057-749F3BE34F7D}"/>
+                <a16:creationId xmlns:a16="http://schemas.microsoft.com/office/drawing/2014/main" id="{878F4551-7201-2542-6EA8-F3124C060BFF}"/>
               </a:ext>
             </a:extLst>
           </p:cNvPr>
@@ -7228,7 +8519,7 @@
           <a:p>
             <a:r>
               <a:rPr lang="ar-SA" dirty="0"/>
-              <a:t>الكائنات</a:t>
+              <a:t>أنواع المجالات في جافا سكربت</a:t>
             </a:r>
             <a:endParaRPr lang="en-TR" dirty="0"/>
           </a:p>
@@ -7239,7 +8530,7 @@
           <p:cNvPr id="3" name="Content Placeholder 2">
             <a:extLst>
               <a:ext uri="{FF2B5EF4-FFF2-40B4-BE49-F238E27FC236}">
-                <a16:creationId xmlns:a16="http://schemas.microsoft.com/office/drawing/2014/main" id="{895FADF5-F066-E14B-A2E4-813E251F427F}"/>
+                <a16:creationId xmlns:a16="http://schemas.microsoft.com/office/drawing/2014/main" id="{BC2A1ADF-58A8-33CC-2628-AEDAA747600F}"/>
               </a:ext>
             </a:extLst>
           </p:cNvPr>
@@ -7267,8 +8558,13 @@
             </a:pPr>
             <a:r>
               <a:rPr lang="ar-SA" dirty="0"/>
-              <a:t>صناعة الكائنات </a:t>
-            </a:r>
+              <a:t>المجال العام </a:t>
+            </a:r>
+            <a:r>
+              <a:rPr lang="en-US" dirty="0"/>
+              <a:t>Global Scope</a:t>
+            </a:r>
+            <a:endParaRPr lang="ar-SA" dirty="0"/>
           </a:p>
           <a:p>
             <a:pPr marL="228600" indent="-228600" algn="r" defTabSz="914400" rtl="1" eaLnBrk="1" latinLnBrk="0" hangingPunct="1">
@@ -7282,17 +8578,14 @@
               <a:buChar char="•"/>
             </a:pPr>
             <a:r>
+              <a:rPr lang="ar-SA" dirty="0"/>
+              <a:t>مجال الدالة </a:t>
+            </a:r>
+            <a:r>
               <a:rPr lang="en-US" dirty="0"/>
-              <a:t>Object Literal</a:t>
-            </a:r>
-            <a:r>
-              <a:rPr lang="ar-SA" dirty="0"/>
-              <a:t> </a:t>
-            </a:r>
-            <a:r>
-              <a:rPr lang="en-US" dirty="0"/>
-              <a:t>{}</a:t>
-            </a:r>
+              <a:t>Function Scope</a:t>
+            </a:r>
+            <a:endParaRPr lang="ar-SA" dirty="0"/>
           </a:p>
           <a:p>
             <a:pPr marL="228600" indent="-228600" algn="r" defTabSz="914400" rtl="1" eaLnBrk="1" latinLnBrk="0" hangingPunct="1">
@@ -7307,19 +8600,11 @@
             </a:pPr>
             <a:r>
               <a:rPr lang="ar-SA" dirty="0"/>
-              <a:t>الدوال البانية</a:t>
+              <a:t>مجال البلوك </a:t>
             </a:r>
             <a:r>
               <a:rPr lang="en-US" dirty="0"/>
-              <a:t>  </a:t>
-            </a:r>
-            <a:r>
-              <a:rPr lang="ar-SA" dirty="0"/>
-              <a:t> </a:t>
-            </a:r>
-            <a:r>
-              <a:rPr lang="en-US" dirty="0"/>
-              <a:t>constructor functions</a:t>
+              <a:t>Block Scope</a:t>
             </a:r>
             <a:endParaRPr lang="ar-SA" dirty="0"/>
           </a:p>
@@ -7336,36 +8621,11 @@
             </a:pPr>
             <a:r>
               <a:rPr lang="ar-SA" dirty="0"/>
-              <a:t>الدوال المصنعة</a:t>
-            </a:r>
-            <a:r>
-              <a:rPr lang="tr-TR" dirty="0"/>
-              <a:t> </a:t>
-            </a:r>
-            <a:r>
-              <a:rPr lang="ar-SA" dirty="0"/>
-              <a:t> </a:t>
+              <a:t>المجال المعجمي </a:t>
             </a:r>
             <a:r>
               <a:rPr lang="en-US" dirty="0"/>
-              <a:t>factory functions</a:t>
-            </a:r>
-            <a:endParaRPr lang="ar-SA" dirty="0"/>
-          </a:p>
-          <a:p>
-            <a:pPr marL="228600" indent="-228600" algn="r" defTabSz="914400" rtl="1" eaLnBrk="1" latinLnBrk="0" hangingPunct="1">
-              <a:lnSpc>
-                <a:spcPct val="90000"/>
-              </a:lnSpc>
-              <a:spcBef>
-                <a:spcPts val="1000"/>
-              </a:spcBef>
-              <a:buFont typeface="Arial" panose="020B0604020202020204" pitchFamily="34" charset="0"/>
-              <a:buChar char="•"/>
-            </a:pPr>
-            <a:r>
-              <a:rPr lang="en-US" dirty="0"/>
-              <a:t>class</a:t>
+              <a:t>lexical scope</a:t>
             </a:r>
             <a:endParaRPr lang="en-TR" dirty="0"/>
           </a:p>
@@ -7374,7 +8634,7 @@
     </p:spTree>
     <p:extLst>
       <p:ext uri="{BB962C8B-B14F-4D97-AF65-F5344CB8AC3E}">
-        <p14:creationId xmlns:p14="http://schemas.microsoft.com/office/powerpoint/2010/main" val="2349570580"/>
+        <p14:creationId xmlns:p14="http://schemas.microsoft.com/office/powerpoint/2010/main" val="438591260"/>
       </p:ext>
     </p:extLst>
   </p:cSld>
@@ -7406,7 +8666,7 @@
           <p:cNvPr id="2" name="Title 1">
             <a:extLst>
               <a:ext uri="{FF2B5EF4-FFF2-40B4-BE49-F238E27FC236}">
-                <a16:creationId xmlns:a16="http://schemas.microsoft.com/office/drawing/2014/main" id="{F9B9A19F-EB45-97F1-B110-1F03A5B3526B}"/>
+                <a16:creationId xmlns:a16="http://schemas.microsoft.com/office/drawing/2014/main" id="{1BA07F05-6BA7-A836-0DE3-F99F6BF4D710}"/>
               </a:ext>
             </a:extLst>
           </p:cNvPr>
@@ -7424,7 +8684,7 @@
           <a:p>
             <a:r>
               <a:rPr lang="ar-SA" dirty="0"/>
-              <a:t>جميع الكائنات تشترك بما يلي</a:t>
+              <a:t>المجال العام</a:t>
             </a:r>
             <a:endParaRPr lang="en-TR" dirty="0"/>
           </a:p>
@@ -7435,7 +8695,7 @@
           <p:cNvPr id="3" name="Content Placeholder 2">
             <a:extLst>
               <a:ext uri="{FF2B5EF4-FFF2-40B4-BE49-F238E27FC236}">
-                <a16:creationId xmlns:a16="http://schemas.microsoft.com/office/drawing/2014/main" id="{027E8964-548C-0F0D-3BE1-D079ED493AF2}"/>
+                <a16:creationId xmlns:a16="http://schemas.microsoft.com/office/drawing/2014/main" id="{A9CAC9BB-A371-B674-A06E-37E6494FBBB7}"/>
               </a:ext>
             </a:extLst>
           </p:cNvPr>
@@ -7448,9 +8708,7 @@
         </p:nvSpPr>
         <p:spPr/>
         <p:txBody>
-          <a:bodyPr>
-            <a:normAutofit fontScale="70000" lnSpcReduction="20000"/>
-          </a:bodyPr>
+          <a:bodyPr/>
           <a:lstStyle/>
           <a:p>
             <a:pPr marL="228600" indent="-228600" algn="r" defTabSz="914400" rtl="1" eaLnBrk="1" latinLnBrk="0" hangingPunct="1">
@@ -7464,16 +8722,8 @@
               <a:buChar char="•"/>
             </a:pPr>
             <a:r>
-              <a:rPr lang="en-US" dirty="0"/>
-              <a:t>__</a:t>
-            </a:r>
-            <a:r>
-              <a:rPr lang="en-US" dirty="0" err="1"/>
-              <a:t>defineGetter</a:t>
-            </a:r>
-            <a:r>
-              <a:rPr lang="en-US" dirty="0"/>
-              <a:t>__</a:t>
+              <a:rPr lang="ar-SA" dirty="0"/>
+              <a:t>يكون المتغير في المجال العام إذا تم تعريفه خارج أي دالة أو بلوك.</a:t>
             </a:r>
           </a:p>
           <a:p>
@@ -7488,16 +8738,8 @@
               <a:buChar char="•"/>
             </a:pPr>
             <a:r>
-              <a:rPr lang="en-US" dirty="0"/>
-              <a:t>__</a:t>
-            </a:r>
-            <a:r>
-              <a:rPr lang="en-US" dirty="0" err="1"/>
-              <a:t>defineSetter</a:t>
-            </a:r>
-            <a:r>
-              <a:rPr lang="en-US" dirty="0"/>
-              <a:t>__</a:t>
+              <a:rPr lang="ar-SA" dirty="0"/>
+              <a:t>يمكن الوصول إلى متغيرات المجال العام من أي جزء من التعليمات البرمجية، بغض النظر عن مكان استخدامها.</a:t>
             </a:r>
           </a:p>
           <a:p>
@@ -7512,16 +8754,8 @@
               <a:buChar char="•"/>
             </a:pPr>
             <a:r>
-              <a:rPr lang="en-US" dirty="0"/>
-              <a:t>__</a:t>
-            </a:r>
-            <a:r>
-              <a:rPr lang="en-US" dirty="0" err="1"/>
-              <a:t>lookupGetter</a:t>
-            </a:r>
-            <a:r>
-              <a:rPr lang="en-US" dirty="0"/>
-              <a:t>__</a:t>
+              <a:rPr lang="ar-SA" dirty="0"/>
+              <a:t>وتظل متاحة طوال عمر التطبيق.</a:t>
             </a:r>
           </a:p>
           <a:p>
@@ -7535,191 +8769,43 @@
               <a:buFont typeface="Arial" panose="020B0604020202020204" pitchFamily="34" charset="0"/>
               <a:buChar char="•"/>
             </a:pPr>
-            <a:r>
-              <a:rPr lang="en-US" dirty="0"/>
-              <a:t>__</a:t>
-            </a:r>
-            <a:r>
-              <a:rPr lang="en-US" dirty="0" err="1"/>
-              <a:t>lookupSetter</a:t>
-            </a:r>
-            <a:r>
-              <a:rPr lang="en-US" dirty="0"/>
-              <a:t>__</a:t>
-            </a:r>
-          </a:p>
-          <a:p>
-            <a:pPr marL="228600" indent="-228600" algn="r" defTabSz="914400" rtl="1" eaLnBrk="1" latinLnBrk="0" hangingPunct="1">
-              <a:lnSpc>
-                <a:spcPct val="90000"/>
-              </a:lnSpc>
-              <a:spcBef>
-                <a:spcPts val="1000"/>
-              </a:spcBef>
-              <a:buFont typeface="Arial" panose="020B0604020202020204" pitchFamily="34" charset="0"/>
-              <a:buChar char="•"/>
-            </a:pPr>
-            <a:r>
-              <a:rPr lang="en-US" dirty="0"/>
-              <a:t>__proto__</a:t>
-            </a:r>
-          </a:p>
-          <a:p>
-            <a:pPr marL="228600" indent="-228600" algn="r" defTabSz="914400" rtl="1" eaLnBrk="1" latinLnBrk="0" hangingPunct="1">
-              <a:lnSpc>
-                <a:spcPct val="90000"/>
-              </a:lnSpc>
-              <a:spcBef>
-                <a:spcPts val="1000"/>
-              </a:spcBef>
-              <a:buFont typeface="Arial" panose="020B0604020202020204" pitchFamily="34" charset="0"/>
-              <a:buChar char="•"/>
-            </a:pPr>
-            <a:r>
-              <a:rPr lang="en-US" dirty="0"/>
-              <a:t>city</a:t>
-            </a:r>
-          </a:p>
-          <a:p>
-            <a:pPr marL="228600" indent="-228600" algn="r" defTabSz="914400" rtl="1" eaLnBrk="1" latinLnBrk="0" hangingPunct="1">
-              <a:lnSpc>
-                <a:spcPct val="90000"/>
-              </a:lnSpc>
-              <a:spcBef>
-                <a:spcPts val="1000"/>
-              </a:spcBef>
-              <a:buFont typeface="Arial" panose="020B0604020202020204" pitchFamily="34" charset="0"/>
-              <a:buChar char="•"/>
-            </a:pPr>
-            <a:r>
-              <a:rPr lang="en-US" dirty="0"/>
-              <a:t>constructor</a:t>
-            </a:r>
-          </a:p>
-          <a:p>
-            <a:pPr marL="228600" indent="-228600" algn="r" defTabSz="914400" rtl="1" eaLnBrk="1" latinLnBrk="0" hangingPunct="1">
-              <a:lnSpc>
-                <a:spcPct val="90000"/>
-              </a:lnSpc>
-              <a:spcBef>
-                <a:spcPts val="1000"/>
-              </a:spcBef>
-              <a:buFont typeface="Arial" panose="020B0604020202020204" pitchFamily="34" charset="0"/>
-              <a:buChar char="•"/>
-            </a:pPr>
-            <a:r>
-              <a:rPr lang="en-US" dirty="0"/>
-              <a:t>greet</a:t>
-            </a:r>
-          </a:p>
-          <a:p>
-            <a:pPr marL="228600" indent="-228600" algn="r" defTabSz="914400" rtl="1" eaLnBrk="1" latinLnBrk="0" hangingPunct="1">
-              <a:lnSpc>
-                <a:spcPct val="90000"/>
-              </a:lnSpc>
-              <a:spcBef>
-                <a:spcPts val="1000"/>
-              </a:spcBef>
-              <a:buFont typeface="Arial" panose="020B0604020202020204" pitchFamily="34" charset="0"/>
-              <a:buChar char="•"/>
-            </a:pPr>
-            <a:r>
-              <a:rPr lang="en-US" dirty="0" err="1"/>
-              <a:t>hasOwnProperty</a:t>
-            </a:r>
-            <a:endParaRPr lang="en-US" dirty="0"/>
-          </a:p>
-          <a:p>
-            <a:pPr marL="228600" indent="-228600" algn="r" defTabSz="914400" rtl="1" eaLnBrk="1" latinLnBrk="0" hangingPunct="1">
-              <a:lnSpc>
-                <a:spcPct val="90000"/>
-              </a:lnSpc>
-              <a:spcBef>
-                <a:spcPts val="1000"/>
-              </a:spcBef>
-              <a:buFont typeface="Arial" panose="020B0604020202020204" pitchFamily="34" charset="0"/>
-              <a:buChar char="•"/>
-            </a:pPr>
-            <a:r>
-              <a:rPr lang="en-US" dirty="0" err="1"/>
-              <a:t>isPrototypeOf</a:t>
-            </a:r>
-            <a:endParaRPr lang="en-US" dirty="0"/>
-          </a:p>
-          <a:p>
-            <a:pPr marL="228600" indent="-228600" algn="r" defTabSz="914400" rtl="1" eaLnBrk="1" latinLnBrk="0" hangingPunct="1">
-              <a:lnSpc>
-                <a:spcPct val="90000"/>
-              </a:lnSpc>
-              <a:spcBef>
-                <a:spcPts val="1000"/>
-              </a:spcBef>
-              <a:buFont typeface="Arial" panose="020B0604020202020204" pitchFamily="34" charset="0"/>
-              <a:buChar char="•"/>
-            </a:pPr>
-            <a:r>
-              <a:rPr lang="en-US" dirty="0" err="1"/>
-              <a:t>propertyIsEnumerable</a:t>
-            </a:r>
-            <a:endParaRPr lang="en-US" dirty="0"/>
-          </a:p>
-          <a:p>
-            <a:pPr marL="228600" indent="-228600" algn="r" defTabSz="914400" rtl="1" eaLnBrk="1" latinLnBrk="0" hangingPunct="1">
-              <a:lnSpc>
-                <a:spcPct val="90000"/>
-              </a:lnSpc>
-              <a:spcBef>
-                <a:spcPts val="1000"/>
-              </a:spcBef>
-              <a:buFont typeface="Arial" panose="020B0604020202020204" pitchFamily="34" charset="0"/>
-              <a:buChar char="•"/>
-            </a:pPr>
-            <a:r>
-              <a:rPr lang="en-US" dirty="0" err="1"/>
-              <a:t>toLocaleString</a:t>
-            </a:r>
-            <a:endParaRPr lang="en-US" dirty="0"/>
-          </a:p>
-          <a:p>
-            <a:pPr marL="228600" indent="-228600" algn="r" defTabSz="914400" rtl="1" eaLnBrk="1" latinLnBrk="0" hangingPunct="1">
-              <a:lnSpc>
-                <a:spcPct val="90000"/>
-              </a:lnSpc>
-              <a:spcBef>
-                <a:spcPts val="1000"/>
-              </a:spcBef>
-              <a:buFont typeface="Arial" panose="020B0604020202020204" pitchFamily="34" charset="0"/>
-              <a:buChar char="•"/>
-            </a:pPr>
-            <a:r>
-              <a:rPr lang="en-US" dirty="0" err="1"/>
-              <a:t>toString</a:t>
-            </a:r>
-            <a:endParaRPr lang="en-US" dirty="0"/>
-          </a:p>
-          <a:p>
-            <a:pPr marL="228600" indent="-228600" algn="r" defTabSz="914400" rtl="1" eaLnBrk="1" latinLnBrk="0" hangingPunct="1">
-              <a:lnSpc>
-                <a:spcPct val="90000"/>
-              </a:lnSpc>
-              <a:spcBef>
-                <a:spcPts val="1000"/>
-              </a:spcBef>
-              <a:buFont typeface="Arial" panose="020B0604020202020204" pitchFamily="34" charset="0"/>
-              <a:buChar char="•"/>
-            </a:pPr>
-            <a:r>
-              <a:rPr lang="en-US" dirty="0" err="1"/>
-              <a:t>valueOf</a:t>
-            </a:r>
             <a:endParaRPr lang="en-TR" dirty="0"/>
           </a:p>
         </p:txBody>
       </p:sp>
+      <p:pic>
+        <p:nvPicPr>
+          <p:cNvPr id="7" name="Picture 6" descr="A black and grey rectangular object with green and white dots&#10;&#10;Description automatically generated">
+            <a:extLst>
+              <a:ext uri="{FF2B5EF4-FFF2-40B4-BE49-F238E27FC236}">
+                <a16:creationId xmlns:a16="http://schemas.microsoft.com/office/drawing/2014/main" id="{73577C03-37DB-A19C-3A89-6FB7970D44C5}"/>
+              </a:ext>
+            </a:extLst>
+          </p:cNvPr>
+          <p:cNvPicPr>
+            <a:picLocks noChangeAspect="1"/>
+          </p:cNvPicPr>
+          <p:nvPr/>
+        </p:nvPicPr>
+        <p:blipFill rotWithShape="1">
+          <a:blip r:embed="rId2"/>
+          <a:srcRect/>
+          <a:stretch/>
+        </p:blipFill>
+        <p:spPr>
+          <a:xfrm>
+            <a:off x="685800" y="4206622"/>
+            <a:ext cx="7721600" cy="1117600"/>
+          </a:xfrm>
+          <a:prstGeom prst="rect">
+            <a:avLst/>
+          </a:prstGeom>
+        </p:spPr>
+      </p:pic>
     </p:spTree>
     <p:extLst>
       <p:ext uri="{BB962C8B-B14F-4D97-AF65-F5344CB8AC3E}">
-        <p14:creationId xmlns:p14="http://schemas.microsoft.com/office/powerpoint/2010/main" val="3834515427"/>
+        <p14:creationId xmlns:p14="http://schemas.microsoft.com/office/powerpoint/2010/main" val="329632838"/>
       </p:ext>
     </p:extLst>
   </p:cSld>
@@ -7751,7 +8837,7 @@
           <p:cNvPr id="2" name="Title 1">
             <a:extLst>
               <a:ext uri="{FF2B5EF4-FFF2-40B4-BE49-F238E27FC236}">
-                <a16:creationId xmlns:a16="http://schemas.microsoft.com/office/drawing/2014/main" id="{EBF21395-AF9F-7AD5-2E49-991CE2798DF9}"/>
+                <a16:creationId xmlns:a16="http://schemas.microsoft.com/office/drawing/2014/main" id="{A6DDF4DC-8EAD-632F-3D16-9025095F6EC8}"/>
               </a:ext>
             </a:extLst>
           </p:cNvPr>
@@ -7769,7 +8855,7 @@
           <a:p>
             <a:r>
               <a:rPr lang="ar-SA" dirty="0"/>
-              <a:t>طبيعة الكائنات في جافا سكربت</a:t>
+              <a:t>مجال الدالة</a:t>
             </a:r>
             <a:endParaRPr lang="en-TR" dirty="0"/>
           </a:p>
@@ -7780,7 +8866,7 @@
           <p:cNvPr id="3" name="Content Placeholder 2">
             <a:extLst>
               <a:ext uri="{FF2B5EF4-FFF2-40B4-BE49-F238E27FC236}">
-                <a16:creationId xmlns:a16="http://schemas.microsoft.com/office/drawing/2014/main" id="{31B53DE7-297A-C09B-A5E2-0EF4610116BA}"/>
+                <a16:creationId xmlns:a16="http://schemas.microsoft.com/office/drawing/2014/main" id="{F5419994-085A-3E68-AE12-1CE3713EBAAF}"/>
               </a:ext>
             </a:extLst>
           </p:cNvPr>
@@ -7808,11 +8894,7 @@
             </a:pPr>
             <a:r>
               <a:rPr lang="ar-SA" dirty="0"/>
-              <a:t>جميع الكائنات يتم بناؤها عن طريق ال </a:t>
-            </a:r>
-            <a:r>
-              <a:rPr lang="en-US" dirty="0"/>
-              <a:t>constructor functions</a:t>
+              <a:t>المتغيرات المعلنة داخل الدالة موجودة في مجال الدالة.</a:t>
             </a:r>
           </a:p>
           <a:p>
@@ -7828,7 +8910,7 @@
             </a:pPr>
             <a:r>
               <a:rPr lang="ar-SA" dirty="0"/>
-              <a:t>كل الدوال هي بالفعل كائنات في نهاية الأمر</a:t>
+              <a:t>هذه المتغيرات يمكن الوصول إليها فقط داخل الدالة، وليس خارجها.</a:t>
             </a:r>
           </a:p>
           <a:p>
@@ -7844,23 +8926,7 @@
             </a:pPr>
             <a:r>
               <a:rPr lang="ar-SA" dirty="0"/>
-              <a:t>الدالة </a:t>
-            </a:r>
-            <a:r>
-              <a:rPr lang="en-US" dirty="0"/>
-              <a:t>Object</a:t>
-            </a:r>
-            <a:r>
-              <a:rPr lang="ar-SA" dirty="0"/>
-              <a:t> هي الدالة الرئيسية لصناعة الكائنات في جافا سكربت والكائن </a:t>
-            </a:r>
-            <a:r>
-              <a:rPr lang="en-US" dirty="0" err="1"/>
-              <a:t>Object.prototype</a:t>
-            </a:r>
-            <a:r>
-              <a:rPr lang="ar-SA" dirty="0"/>
-              <a:t> يتربع على هرم الكائنات.</a:t>
+              <a:t>يتم تدميرها بمجرد اكتمال استدعاء الدالة.</a:t>
             </a:r>
           </a:p>
           <a:p>
@@ -7875,10 +8941,21 @@
               <a:buChar char="•"/>
             </a:pPr>
             <a:r>
-              <a:rPr lang="en-US" dirty="0" err="1"/>
-              <a:t>Car.prototype</a:t>
-            </a:r>
-            <a:endParaRPr lang="en-US" dirty="0"/>
+              <a:rPr lang="en-US" dirty="0"/>
+              <a:t>Var</a:t>
+            </a:r>
+            <a:r>
+              <a:rPr lang="ar-SA" dirty="0"/>
+              <a:t> </a:t>
+            </a:r>
+            <a:r>
+              <a:rPr lang="en-US" dirty="0"/>
+              <a:t> </a:t>
+            </a:r>
+            <a:r>
+              <a:rPr lang="ar-SA" dirty="0"/>
+              <a:t>ذات نطاق دالي.</a:t>
+            </a:r>
           </a:p>
           <a:p>
             <a:pPr marL="228600" indent="-228600" algn="r" defTabSz="914400" rtl="1" eaLnBrk="1" latinLnBrk="0" hangingPunct="1">
@@ -7891,55 +8968,44 @@
               <a:buFont typeface="Arial" panose="020B0604020202020204" pitchFamily="34" charset="0"/>
               <a:buChar char="•"/>
             </a:pPr>
-            <a:r>
-              <a:rPr lang="en-US" dirty="0" err="1"/>
-              <a:t>Car.__proto</a:t>
-            </a:r>
-            <a:r>
-              <a:rPr lang="en-US" dirty="0"/>
-              <a:t>__</a:t>
-            </a:r>
-          </a:p>
-          <a:p>
-            <a:pPr marL="228600" indent="-228600" algn="r" defTabSz="914400" rtl="1" eaLnBrk="1" latinLnBrk="0" hangingPunct="1">
-              <a:lnSpc>
-                <a:spcPct val="90000"/>
-              </a:lnSpc>
-              <a:spcBef>
-                <a:spcPts val="1000"/>
-              </a:spcBef>
-              <a:buFont typeface="Arial" panose="020B0604020202020204" pitchFamily="34" charset="0"/>
-              <a:buChar char="•"/>
-            </a:pPr>
-            <a:r>
-              <a:rPr lang="en-US" dirty="0" err="1"/>
-              <a:t>Car.prototype.constructor</a:t>
-            </a:r>
-            <a:endParaRPr lang="en-US" dirty="0"/>
-          </a:p>
-          <a:p>
-            <a:pPr marL="228600" indent="-228600" algn="r" defTabSz="914400" rtl="1" eaLnBrk="1" latinLnBrk="0" hangingPunct="1">
-              <a:lnSpc>
-                <a:spcPct val="90000"/>
-              </a:lnSpc>
-              <a:spcBef>
-                <a:spcPts val="1000"/>
-              </a:spcBef>
-              <a:buFont typeface="Arial" panose="020B0604020202020204" pitchFamily="34" charset="0"/>
-              <a:buChar char="•"/>
-            </a:pPr>
-            <a:r>
-              <a:rPr lang="en-US" dirty="0" err="1"/>
-              <a:t>Car.prototype.__proto</a:t>
-            </a:r>
-            <a:endParaRPr lang="ar-SA" dirty="0"/>
-          </a:p>
-        </p:txBody>
-      </p:sp>
+            <a:endParaRPr lang="en-TR" dirty="0"/>
+          </a:p>
+        </p:txBody>
+      </p:sp>
+      <p:pic>
+        <p:nvPicPr>
+          <p:cNvPr id="5" name="Picture 4" descr="A black screen with green text&#10;&#10;Description automatically generated">
+            <a:extLst>
+              <a:ext uri="{FF2B5EF4-FFF2-40B4-BE49-F238E27FC236}">
+                <a16:creationId xmlns:a16="http://schemas.microsoft.com/office/drawing/2014/main" id="{A09DEFAC-EF30-9DBC-4454-0C4068A43EC9}"/>
+              </a:ext>
+            </a:extLst>
+          </p:cNvPr>
+          <p:cNvPicPr>
+            <a:picLocks noChangeAspect="1"/>
+          </p:cNvPicPr>
+          <p:nvPr/>
+        </p:nvPicPr>
+        <p:blipFill>
+          <a:blip r:embed="rId2"/>
+          <a:stretch>
+            <a:fillRect/>
+          </a:stretch>
+        </p:blipFill>
+        <p:spPr>
+          <a:xfrm>
+            <a:off x="361055" y="4066505"/>
+            <a:ext cx="7683500" cy="1676400"/>
+          </a:xfrm>
+          <a:prstGeom prst="rect">
+            <a:avLst/>
+          </a:prstGeom>
+        </p:spPr>
+      </p:pic>
     </p:spTree>
     <p:extLst>
       <p:ext uri="{BB962C8B-B14F-4D97-AF65-F5344CB8AC3E}">
-        <p14:creationId xmlns:p14="http://schemas.microsoft.com/office/powerpoint/2010/main" val="4182919077"/>
+        <p14:creationId xmlns:p14="http://schemas.microsoft.com/office/powerpoint/2010/main" val="2217052135"/>
       </p:ext>
     </p:extLst>
   </p:cSld>

</xml_diff>